<commit_message>
Changed title slide and schedule slide
</commit_message>
<xml_diff>
--- a/Notes and Slides/Wk7Day1-SQLite.pptx
+++ b/Notes and Slides/Wk7Day1-SQLite.pptx
@@ -148,6 +148,20 @@
         </p14:section>
       </p14:sectionLst>
     </p:ext>
+    <p:ext uri="{EFAFB233-063F-42B5-8137-9DF3F51BA10A}">
+      <p15:sldGuideLst xmlns:p15="http://schemas.microsoft.com/office/powerpoint/2012/main">
+        <p15:guide id="1" orient="horz" pos="2160">
+          <p15:clr>
+            <a:srgbClr val="A4A3A4"/>
+          </p15:clr>
+        </p15:guide>
+        <p15:guide id="2" pos="2880">
+          <p15:clr>
+            <a:srgbClr val="A4A3A4"/>
+          </p15:clr>
+        </p15:guide>
+      </p15:sldGuideLst>
+    </p:ext>
   </p:extLst>
 </p:presentation>
 </file>
@@ -234,7 +248,7 @@
           <a:p>
             <a:fld id="{59B6F58A-1DC9-9140-A6F1-5CAF629CE03F}" type="datetimeFigureOut">
               <a:rPr lang="en-US" smtClean="0"/>
-              <a:t>5/9/16</a:t>
+              <a:t>5/22/17</a:t>
             </a:fld>
             <a:endParaRPr lang="en-US"/>
           </a:p>
@@ -771,7 +785,7 @@
           <a:p>
             <a:fld id="{7CE38E4D-051A-41E1-86A4-E56916468FD0}" type="datetimeFigureOut">
               <a:rPr lang="en-US" smtClean="0"/>
-              <a:t>5/9/16</a:t>
+              <a:t>5/22/17</a:t>
             </a:fld>
             <a:endParaRPr lang="en-US"/>
           </a:p>
@@ -936,7 +950,7 @@
           <a:p>
             <a:fld id="{7CE38E4D-051A-41E1-86A4-E56916468FD0}" type="datetimeFigureOut">
               <a:rPr lang="en-US" smtClean="0"/>
-              <a:t>5/9/16</a:t>
+              <a:t>5/22/17</a:t>
             </a:fld>
             <a:endParaRPr lang="en-US"/>
           </a:p>
@@ -1111,7 +1125,7 @@
           <a:p>
             <a:fld id="{7CE38E4D-051A-41E1-86A4-E56916468FD0}" type="datetimeFigureOut">
               <a:rPr lang="en-US" smtClean="0"/>
-              <a:t>5/9/16</a:t>
+              <a:t>5/22/17</a:t>
             </a:fld>
             <a:endParaRPr lang="en-US"/>
           </a:p>
@@ -1276,7 +1290,7 @@
           <a:p>
             <a:fld id="{7CE38E4D-051A-41E1-86A4-E56916468FD0}" type="datetimeFigureOut">
               <a:rPr lang="en-US" smtClean="0"/>
-              <a:t>5/9/16</a:t>
+              <a:t>5/22/17</a:t>
             </a:fld>
             <a:endParaRPr lang="en-US"/>
           </a:p>
@@ -1515,7 +1529,7 @@
           <a:p>
             <a:fld id="{7CE38E4D-051A-41E1-86A4-E56916468FD0}" type="datetimeFigureOut">
               <a:rPr lang="en-US" smtClean="0"/>
-              <a:t>5/9/16</a:t>
+              <a:t>5/22/17</a:t>
             </a:fld>
             <a:endParaRPr lang="en-US"/>
           </a:p>
@@ -1798,7 +1812,7 @@
           <a:p>
             <a:fld id="{7CE38E4D-051A-41E1-86A4-E56916468FD0}" type="datetimeFigureOut">
               <a:rPr lang="en-US" smtClean="0"/>
-              <a:t>5/9/16</a:t>
+              <a:t>5/22/17</a:t>
             </a:fld>
             <a:endParaRPr lang="en-US"/>
           </a:p>
@@ -2215,7 +2229,7 @@
           <a:p>
             <a:fld id="{7CE38E4D-051A-41E1-86A4-E56916468FD0}" type="datetimeFigureOut">
               <a:rPr lang="en-US" smtClean="0"/>
-              <a:t>5/9/16</a:t>
+              <a:t>5/22/17</a:t>
             </a:fld>
             <a:endParaRPr lang="en-US"/>
           </a:p>
@@ -2328,7 +2342,7 @@
           <a:p>
             <a:fld id="{7CE38E4D-051A-41E1-86A4-E56916468FD0}" type="datetimeFigureOut">
               <a:rPr lang="en-US" smtClean="0"/>
-              <a:t>5/9/16</a:t>
+              <a:t>5/22/17</a:t>
             </a:fld>
             <a:endParaRPr lang="en-US"/>
           </a:p>
@@ -2418,7 +2432,7 @@
           <a:p>
             <a:fld id="{7CE38E4D-051A-41E1-86A4-E56916468FD0}" type="datetimeFigureOut">
               <a:rPr lang="en-US" smtClean="0"/>
-              <a:t>5/9/16</a:t>
+              <a:t>5/22/17</a:t>
             </a:fld>
             <a:endParaRPr lang="en-US"/>
           </a:p>
@@ -2697,7 +2711,7 @@
           <a:p>
             <a:fld id="{7CE38E4D-051A-41E1-86A4-E56916468FD0}" type="datetimeFigureOut">
               <a:rPr lang="en-US" smtClean="0"/>
-              <a:t>5/9/16</a:t>
+              <a:t>5/22/17</a:t>
             </a:fld>
             <a:endParaRPr lang="en-US"/>
           </a:p>
@@ -2956,7 +2970,7 @@
           <a:p>
             <a:fld id="{7CE38E4D-051A-41E1-86A4-E56916468FD0}" type="datetimeFigureOut">
               <a:rPr lang="en-US" smtClean="0"/>
-              <a:t>5/9/16</a:t>
+              <a:t>5/22/17</a:t>
             </a:fld>
             <a:endParaRPr lang="en-US"/>
           </a:p>
@@ -3164,7 +3178,7 @@
           <a:p>
             <a:fld id="{7CE38E4D-051A-41E1-86A4-E56916468FD0}" type="datetimeFigureOut">
               <a:rPr lang="en-US" smtClean="0"/>
-              <a:t>5/9/16</a:t>
+              <a:t>5/22/17</a:t>
             </a:fld>
             <a:endParaRPr lang="en-US"/>
           </a:p>
@@ -3692,8 +3706,8 @@
         </p:nvSpPr>
         <p:spPr>
           <a:xfrm>
-            <a:off x="3193977" y="5065578"/>
-            <a:ext cx="2574480" cy="923330"/>
+            <a:off x="2583742" y="5065578"/>
+            <a:ext cx="3794950" cy="646331"/>
           </a:xfrm>
           <a:prstGeom prst="rect">
             <a:avLst/>
@@ -3724,14 +3738,11 @@
             </a:r>
             <a:r>
               <a:rPr lang="en-US" dirty="0" smtClean="0"/>
-              <a:t>2016</a:t>
-            </a:r>
-          </a:p>
-          <a:p>
-            <a:pPr algn="ctr"/>
-            <a:r>
-              <a:rPr lang="en-US" dirty="0" smtClean="0"/>
-              <a:t>Lane Community College</a:t>
+              <a:t>20167Lane </a:t>
+            </a:r>
+            <a:r>
+              <a:rPr lang="en-US" dirty="0" smtClean="0"/>
+              <a:t>Community College</a:t>
             </a:r>
           </a:p>
         </p:txBody>
@@ -3749,7 +3760,7 @@
   <p:timing>
     <p:tnLst>
       <p:par>
-        <p:cTn xmlns:p14="http://schemas.microsoft.com/office/powerpoint/2010/main" id="1" dur="indefinite" restart="never" nodeType="tmRoot"/>
+        <p:cTn id="1" dur="indefinite" restart="never" nodeType="tmRoot"/>
       </p:par>
     </p:tnLst>
   </p:timing>
@@ -4737,7 +4748,7 @@
         </p:nvGraphicFramePr>
         <p:xfrm>
           <a:off x="356277" y="2033752"/>
-          <a:ext cx="3991801" cy="4298237"/>
+          <a:ext cx="3991801" cy="4298238"/>
         </p:xfrm>
         <a:graphic>
           <a:graphicData uri="http://schemas.openxmlformats.org/drawingml/2006/table">
@@ -5384,6 +5395,657 @@
                         <a:rPr lang="en-US" sz="2800" dirty="0" smtClean="0"/>
                         <a:t>the Google Play Store</a:t>
                       </a:r>
+                    </a:p>
+                  </a:txBody>
+                  <a:tcPr/>
+                </a:tc>
+              </a:tr>
+            </a:tbl>
+          </a:graphicData>
+        </a:graphic>
+      </p:graphicFrame>
+      <p:graphicFrame>
+        <p:nvGraphicFramePr>
+          <p:cNvPr id="7" name="Content Placeholder 4"/>
+          <p:cNvGraphicFramePr>
+            <a:graphicFrameLocks/>
+          </p:cNvGraphicFramePr>
+          <p:nvPr>
+            <p:extLst>
+              <p:ext uri="{D42A27DB-BD31-4B8C-83A1-F6EECF244321}">
+                <p14:modId xmlns:p14="http://schemas.microsoft.com/office/powerpoint/2010/main" val="1122279541"/>
+              </p:ext>
+            </p:extLst>
+          </p:nvPr>
+        </p:nvGraphicFramePr>
+        <p:xfrm>
+          <a:off x="356277" y="2033752"/>
+          <a:ext cx="3991801" cy="4298238"/>
+        </p:xfrm>
+        <a:graphic>
+          <a:graphicData uri="http://schemas.openxmlformats.org/drawingml/2006/table">
+            <a:tbl>
+              <a:tblPr firstRow="1" bandRow="1">
+                <a:tableStyleId>{775DCB02-9BB8-47FD-8907-85C794F793BA}</a:tableStyleId>
+              </a:tblPr>
+              <a:tblGrid>
+                <a:gridCol w="511701"/>
+                <a:gridCol w="3480100"/>
+              </a:tblGrid>
+              <a:tr h="427278">
+                <a:tc>
+                  <a:txBody>
+                    <a:bodyPr/>
+                    <a:lstStyle/>
+                    <a:p>
+                      <a:r>
+                        <a:rPr lang="en-US" dirty="0" smtClean="0"/>
+                        <a:t>Wk</a:t>
+                      </a:r>
+                      <a:endParaRPr lang="en-US" dirty="0"/>
+                    </a:p>
+                  </a:txBody>
+                  <a:tcPr/>
+                </a:tc>
+                <a:tc>
+                  <a:txBody>
+                    <a:bodyPr/>
+                    <a:lstStyle/>
+                    <a:p>
+                      <a:r>
+                        <a:rPr lang="en-US" dirty="0" smtClean="0"/>
+                        <a:t>Topic</a:t>
+                      </a:r>
+                      <a:endParaRPr lang="en-US" dirty="0"/>
+                    </a:p>
+                  </a:txBody>
+                  <a:tcPr/>
+                </a:tc>
+              </a:tr>
+              <a:tr h="942660">
+                <a:tc>
+                  <a:txBody>
+                    <a:bodyPr/>
+                    <a:lstStyle/>
+                    <a:p>
+                      <a:r>
+                        <a:rPr lang="en-US" sz="2800" dirty="0" smtClean="0"/>
+                        <a:t>1</a:t>
+                      </a:r>
+                      <a:endParaRPr lang="en-US" sz="2800" dirty="0"/>
+                    </a:p>
+                  </a:txBody>
+                  <a:tcPr/>
+                </a:tc>
+                <a:tc>
+                  <a:txBody>
+                    <a:bodyPr/>
+                    <a:lstStyle/>
+                    <a:p>
+                      <a:pPr marL="0" marR="0" indent="0" algn="l" defTabSz="457200" rtl="0" eaLnBrk="1" fontAlgn="auto" latinLnBrk="0" hangingPunct="1">
+                        <a:lnSpc>
+                          <a:spcPct val="100000"/>
+                        </a:lnSpc>
+                        <a:spcBef>
+                          <a:spcPts val="0"/>
+                        </a:spcBef>
+                        <a:spcAft>
+                          <a:spcPts val="0"/>
+                        </a:spcAft>
+                        <a:buClrTx/>
+                        <a:buSzTx/>
+                        <a:buFontTx/>
+                        <a:buNone/>
+                        <a:tabLst/>
+                        <a:defRPr/>
+                      </a:pPr>
+                      <a:r>
+                        <a:rPr lang="en-US" sz="2800" dirty="0" smtClean="0"/>
+                        <a:t>Intro</a:t>
+                      </a:r>
+                      <a:r>
+                        <a:rPr lang="en-US" sz="2800" baseline="0" dirty="0" smtClean="0"/>
+                        <a:t> +</a:t>
+                      </a:r>
+                      <a:r>
+                        <a:rPr lang="en-US" sz="2800" dirty="0" smtClean="0"/>
+                        <a:t> single-screen apps</a:t>
+                      </a:r>
+                    </a:p>
+                  </a:txBody>
+                  <a:tcPr/>
+                </a:tc>
+              </a:tr>
+              <a:tr h="942660">
+                <a:tc>
+                  <a:txBody>
+                    <a:bodyPr/>
+                    <a:lstStyle/>
+                    <a:p>
+                      <a:r>
+                        <a:rPr lang="en-US" sz="2800" dirty="0" smtClean="0"/>
+                        <a:t>2</a:t>
+                      </a:r>
+                      <a:endParaRPr lang="en-US" sz="2800" dirty="0"/>
+                    </a:p>
+                  </a:txBody>
+                  <a:tcPr>
+                    <a:noFill/>
+                  </a:tcPr>
+                </a:tc>
+                <a:tc>
+                  <a:txBody>
+                    <a:bodyPr/>
+                    <a:lstStyle/>
+                    <a:p>
+                      <a:pPr marL="0" marR="0" indent="0" algn="l" defTabSz="457200" rtl="0" eaLnBrk="1" fontAlgn="auto" latinLnBrk="0" hangingPunct="1">
+                        <a:lnSpc>
+                          <a:spcPct val="100000"/>
+                        </a:lnSpc>
+                        <a:spcBef>
+                          <a:spcPts val="0"/>
+                        </a:spcBef>
+                        <a:spcAft>
+                          <a:spcPts val="0"/>
+                        </a:spcAft>
+                        <a:buClrTx/>
+                        <a:buSzTx/>
+                        <a:buFontTx/>
+                        <a:buNone/>
+                        <a:tabLst/>
+                        <a:defRPr/>
+                      </a:pPr>
+                      <a:r>
+                        <a:rPr lang="en-US" sz="2800" dirty="0" smtClean="0"/>
+                        <a:t>Multi-screen (multi-activity) apps</a:t>
+                      </a:r>
+                    </a:p>
+                  </a:txBody>
+                  <a:tcPr>
+                    <a:noFill/>
+                  </a:tcPr>
+                </a:tc>
+              </a:tr>
+              <a:tr h="942660">
+                <a:tc>
+                  <a:txBody>
+                    <a:bodyPr/>
+                    <a:lstStyle/>
+                    <a:p>
+                      <a:r>
+                        <a:rPr lang="en-US" sz="2800" dirty="0" smtClean="0"/>
+                        <a:t>3</a:t>
+                      </a:r>
+                      <a:endParaRPr lang="en-US" sz="2800" dirty="0"/>
+                    </a:p>
+                  </a:txBody>
+                  <a:tcPr>
+                    <a:solidFill>
+                      <a:schemeClr val="accent4">
+                        <a:alpha val="40000"/>
+                      </a:schemeClr>
+                    </a:solidFill>
+                  </a:tcPr>
+                </a:tc>
+                <a:tc>
+                  <a:txBody>
+                    <a:bodyPr/>
+                    <a:lstStyle/>
+                    <a:p>
+                      <a:pPr marL="0" marR="0" indent="0" algn="l" defTabSz="457200" rtl="0" eaLnBrk="1" fontAlgn="auto" latinLnBrk="0" hangingPunct="1">
+                        <a:lnSpc>
+                          <a:spcPct val="100000"/>
+                        </a:lnSpc>
+                        <a:spcBef>
+                          <a:spcPts val="0"/>
+                        </a:spcBef>
+                        <a:spcAft>
+                          <a:spcPts val="0"/>
+                        </a:spcAft>
+                        <a:buClrTx/>
+                        <a:buSzTx/>
+                        <a:buFontTx/>
+                        <a:buNone/>
+                        <a:tabLst/>
+                        <a:defRPr/>
+                      </a:pPr>
+                      <a:r>
+                        <a:rPr lang="en-US" sz="2800" dirty="0" smtClean="0"/>
+                        <a:t>Activity lifecycle</a:t>
+                      </a:r>
+                      <a:r>
+                        <a:rPr lang="en-US" sz="2800" baseline="0" dirty="0" smtClean="0"/>
+                        <a:t> and state</a:t>
+                      </a:r>
+                      <a:endParaRPr lang="en-US" sz="2800" dirty="0" smtClean="0"/>
+                    </a:p>
+                  </a:txBody>
+                  <a:tcPr>
+                    <a:solidFill>
+                      <a:schemeClr val="accent4">
+                        <a:alpha val="40000"/>
+                      </a:schemeClr>
+                    </a:solidFill>
+                  </a:tcPr>
+                </a:tc>
+              </a:tr>
+              <a:tr h="516942">
+                <a:tc>
+                  <a:txBody>
+                    <a:bodyPr/>
+                    <a:lstStyle/>
+                    <a:p>
+                      <a:r>
+                        <a:rPr lang="en-US" sz="2800" dirty="0" smtClean="0"/>
+                        <a:t>4</a:t>
+                      </a:r>
+                      <a:endParaRPr lang="en-US" sz="2800" dirty="0"/>
+                    </a:p>
+                  </a:txBody>
+                  <a:tcPr>
+                    <a:noFill/>
+                  </a:tcPr>
+                </a:tc>
+                <a:tc rowSpan="2">
+                  <a:txBody>
+                    <a:bodyPr/>
+                    <a:lstStyle/>
+                    <a:p>
+                      <a:pPr marL="0" marR="0" indent="0" algn="l" defTabSz="457200" rtl="0" eaLnBrk="1" fontAlgn="auto" latinLnBrk="0" hangingPunct="1">
+                        <a:lnSpc>
+                          <a:spcPct val="100000"/>
+                        </a:lnSpc>
+                        <a:spcBef>
+                          <a:spcPts val="0"/>
+                        </a:spcBef>
+                        <a:spcAft>
+                          <a:spcPts val="0"/>
+                        </a:spcAft>
+                        <a:buClrTx/>
+                        <a:buSzTx/>
+                        <a:buFontTx/>
+                        <a:buNone/>
+                        <a:tabLst/>
+                        <a:defRPr/>
+                      </a:pPr>
+                      <a:r>
+                        <a:rPr lang="en-US" sz="2800" dirty="0" smtClean="0"/>
+                        <a:t>List</a:t>
+                      </a:r>
+                      <a:r>
+                        <a:rPr lang="en-US" sz="2800" baseline="0" dirty="0" smtClean="0"/>
+                        <a:t> Views + Adapters</a:t>
+                      </a:r>
+                      <a:endParaRPr lang="en-US" sz="2800" dirty="0" smtClean="0"/>
+                    </a:p>
+                  </a:txBody>
+                  <a:tcPr>
+                    <a:noFill/>
+                  </a:tcPr>
+                </a:tc>
+              </a:tr>
+              <a:tr h="516942">
+                <a:tc>
+                  <a:txBody>
+                    <a:bodyPr/>
+                    <a:lstStyle/>
+                    <a:p>
+                      <a:r>
+                        <a:rPr lang="en-US" sz="2800" dirty="0" smtClean="0"/>
+                        <a:t>5</a:t>
+                      </a:r>
+                      <a:endParaRPr lang="en-US" sz="2800" dirty="0"/>
+                    </a:p>
+                  </a:txBody>
+                  <a:tcPr>
+                    <a:solidFill>
+                      <a:schemeClr val="accent4">
+                        <a:lumMod val="60000"/>
+                        <a:lumOff val="40000"/>
+                        <a:alpha val="40000"/>
+                      </a:schemeClr>
+                    </a:solidFill>
+                  </a:tcPr>
+                </a:tc>
+                <a:tc vMerge="1">
+                  <a:txBody>
+                    <a:bodyPr/>
+                    <a:lstStyle/>
+                    <a:p>
+                      <a:pPr marL="0" marR="0" indent="0" algn="l" defTabSz="457200" rtl="0" eaLnBrk="1" fontAlgn="auto" latinLnBrk="0" hangingPunct="1">
+                        <a:lnSpc>
+                          <a:spcPct val="100000"/>
+                        </a:lnSpc>
+                        <a:spcBef>
+                          <a:spcPts val="0"/>
+                        </a:spcBef>
+                        <a:spcAft>
+                          <a:spcPts val="0"/>
+                        </a:spcAft>
+                        <a:buClrTx/>
+                        <a:buSzTx/>
+                        <a:buFontTx/>
+                        <a:buNone/>
+                        <a:tabLst/>
+                        <a:defRPr/>
+                      </a:pPr>
+                      <a:endParaRPr lang="en-US" sz="2800" dirty="0" smtClean="0"/>
+                    </a:p>
+                  </a:txBody>
+                  <a:tcPr>
+                    <a:solidFill>
+                      <a:schemeClr val="accent1">
+                        <a:alpha val="40000"/>
+                      </a:schemeClr>
+                    </a:solidFill>
+                  </a:tcPr>
+                </a:tc>
+              </a:tr>
+            </a:tbl>
+          </a:graphicData>
+        </a:graphic>
+      </p:graphicFrame>
+      <p:graphicFrame>
+        <p:nvGraphicFramePr>
+          <p:cNvPr id="9" name="Content Placeholder 7"/>
+          <p:cNvGraphicFramePr>
+            <a:graphicFrameLocks/>
+          </p:cNvGraphicFramePr>
+          <p:nvPr>
+            <p:extLst>
+              <p:ext uri="{D42A27DB-BD31-4B8C-83A1-F6EECF244321}">
+                <p14:modId xmlns:p14="http://schemas.microsoft.com/office/powerpoint/2010/main" val="803373986"/>
+              </p:ext>
+            </p:extLst>
+          </p:nvPr>
+        </p:nvGraphicFramePr>
+        <p:xfrm>
+          <a:off x="4507872" y="2033752"/>
+          <a:ext cx="4297617" cy="4291763"/>
+        </p:xfrm>
+        <a:graphic>
+          <a:graphicData uri="http://schemas.openxmlformats.org/drawingml/2006/table">
+            <a:tbl>
+              <a:tblPr firstRow="1" bandRow="1">
+                <a:tableStyleId>{775DCB02-9BB8-47FD-8907-85C794F793BA}</a:tableStyleId>
+              </a:tblPr>
+              <a:tblGrid>
+                <a:gridCol w="546664"/>
+                <a:gridCol w="3750953"/>
+              </a:tblGrid>
+              <a:tr h="318056">
+                <a:tc>
+                  <a:txBody>
+                    <a:bodyPr/>
+                    <a:lstStyle/>
+                    <a:p>
+                      <a:r>
+                        <a:rPr lang="en-US" dirty="0" smtClean="0"/>
+                        <a:t>Wk</a:t>
+                      </a:r>
+                      <a:endParaRPr lang="en-US" dirty="0"/>
+                    </a:p>
+                  </a:txBody>
+                  <a:tcPr/>
+                </a:tc>
+                <a:tc>
+                  <a:txBody>
+                    <a:bodyPr/>
+                    <a:lstStyle/>
+                    <a:p>
+                      <a:r>
+                        <a:rPr lang="en-US" dirty="0" smtClean="0"/>
+                        <a:t>Topic</a:t>
+                      </a:r>
+                      <a:endParaRPr lang="en-US" dirty="0"/>
+                    </a:p>
+                  </a:txBody>
+                  <a:tcPr/>
+                </a:tc>
+              </a:tr>
+              <a:tr h="783339">
+                <a:tc>
+                  <a:txBody>
+                    <a:bodyPr/>
+                    <a:lstStyle/>
+                    <a:p>
+                      <a:r>
+                        <a:rPr lang="en-US" sz="2800" dirty="0" smtClean="0"/>
+                        <a:t>6</a:t>
+                      </a:r>
+                      <a:endParaRPr lang="en-US" sz="2800" dirty="0"/>
+                    </a:p>
+                  </a:txBody>
+                  <a:tcPr/>
+                </a:tc>
+                <a:tc>
+                  <a:txBody>
+                    <a:bodyPr/>
+                    <a:lstStyle/>
+                    <a:p>
+                      <a:pPr marL="0" marR="0" indent="0" algn="l" defTabSz="457200" rtl="0" eaLnBrk="1" fontAlgn="auto" latinLnBrk="0" hangingPunct="1">
+                        <a:lnSpc>
+                          <a:spcPct val="100000"/>
+                        </a:lnSpc>
+                        <a:spcBef>
+                          <a:spcPts val="0"/>
+                        </a:spcBef>
+                        <a:spcAft>
+                          <a:spcPts val="0"/>
+                        </a:spcAft>
+                        <a:buClrTx/>
+                        <a:buSzTx/>
+                        <a:buFontTx/>
+                        <a:buNone/>
+                        <a:tabLst/>
+                        <a:defRPr/>
+                      </a:pPr>
+                      <a:r>
+                        <a:rPr lang="en-US" sz="2800" dirty="0" smtClean="0"/>
+                        <a:t>Layouts + </a:t>
+                      </a:r>
+                      <a:r>
+                        <a:rPr lang="en-US" sz="2800" baseline="0" dirty="0" smtClean="0"/>
+                        <a:t>orientation</a:t>
+                      </a:r>
+                      <a:endParaRPr lang="en-US" sz="2800" dirty="0" smtClean="0"/>
+                    </a:p>
+                  </a:txBody>
+                  <a:tcPr/>
+                </a:tc>
+              </a:tr>
+              <a:tr h="948426">
+                <a:tc>
+                  <a:txBody>
+                    <a:bodyPr/>
+                    <a:lstStyle/>
+                    <a:p>
+                      <a:r>
+                        <a:rPr lang="en-US" sz="2800" dirty="0" smtClean="0"/>
+                        <a:t>7</a:t>
+                      </a:r>
+                      <a:endParaRPr lang="en-US" sz="2800" dirty="0"/>
+                    </a:p>
+                  </a:txBody>
+                  <a:tcPr/>
+                </a:tc>
+                <a:tc>
+                  <a:txBody>
+                    <a:bodyPr/>
+                    <a:lstStyle/>
+                    <a:p>
+                      <a:pPr marL="0" marR="0" indent="0" algn="l" defTabSz="457200" rtl="0" eaLnBrk="1" fontAlgn="auto" latinLnBrk="0" hangingPunct="1">
+                        <a:lnSpc>
+                          <a:spcPct val="100000"/>
+                        </a:lnSpc>
+                        <a:spcBef>
+                          <a:spcPts val="0"/>
+                        </a:spcBef>
+                        <a:spcAft>
+                          <a:spcPts val="0"/>
+                        </a:spcAft>
+                        <a:buClrTx/>
+                        <a:buSzTx/>
+                        <a:buFontTx/>
+                        <a:buNone/>
+                        <a:tabLst/>
+                        <a:defRPr/>
+                      </a:pPr>
+                      <a:r>
+                        <a:rPr lang="en-US" sz="2800" dirty="0" smtClean="0"/>
+                        <a:t>Adapting to size and orientation: fragments</a:t>
+                      </a:r>
+                    </a:p>
+                  </a:txBody>
+                  <a:tcPr/>
+                </a:tc>
+              </a:tr>
+              <a:tr h="578700">
+                <a:tc>
+                  <a:txBody>
+                    <a:bodyPr/>
+                    <a:lstStyle/>
+                    <a:p>
+                      <a:r>
+                        <a:rPr lang="en-US" sz="2800" dirty="0" smtClean="0"/>
+                        <a:t>8</a:t>
+                      </a:r>
+                      <a:endParaRPr lang="en-US" sz="2800" dirty="0"/>
+                    </a:p>
+                  </a:txBody>
+                  <a:tcPr>
+                    <a:solidFill>
+                      <a:schemeClr val="accent1">
+                        <a:alpha val="40000"/>
+                      </a:schemeClr>
+                    </a:solidFill>
+                  </a:tcPr>
+                </a:tc>
+                <a:tc>
+                  <a:txBody>
+                    <a:bodyPr/>
+                    <a:lstStyle/>
+                    <a:p>
+                      <a:pPr marL="0" marR="0" indent="0" algn="l" defTabSz="457200" rtl="0" eaLnBrk="1" fontAlgn="auto" latinLnBrk="0" hangingPunct="1">
+                        <a:lnSpc>
+                          <a:spcPct val="100000"/>
+                        </a:lnSpc>
+                        <a:spcBef>
+                          <a:spcPts val="0"/>
+                        </a:spcBef>
+                        <a:spcAft>
+                          <a:spcPts val="0"/>
+                        </a:spcAft>
+                        <a:buClrTx/>
+                        <a:buSzTx/>
+                        <a:buFontTx/>
+                        <a:buNone/>
+                        <a:tabLst/>
+                        <a:defRPr/>
+                      </a:pPr>
+                      <a:r>
+                        <a:rPr lang="en-US" sz="2800" dirty="0" smtClean="0"/>
+                        <a:t>Managing data: SQLite</a:t>
+                      </a:r>
+                    </a:p>
+                  </a:txBody>
+                  <a:tcPr>
+                    <a:solidFill>
+                      <a:schemeClr val="accent1">
+                        <a:alpha val="40000"/>
+                      </a:schemeClr>
+                    </a:solidFill>
+                  </a:tcPr>
+                </a:tc>
+              </a:tr>
+              <a:tr h="525177">
+                <a:tc>
+                  <a:txBody>
+                    <a:bodyPr/>
+                    <a:lstStyle/>
+                    <a:p>
+                      <a:r>
+                        <a:rPr lang="en-US" sz="2800" dirty="0" smtClean="0"/>
+                        <a:t>9</a:t>
+                      </a:r>
+                      <a:endParaRPr lang="en-US" sz="2800" dirty="0"/>
+                    </a:p>
+                  </a:txBody>
+                  <a:tcPr/>
+                </a:tc>
+                <a:tc>
+                  <a:txBody>
+                    <a:bodyPr/>
+                    <a:lstStyle/>
+                    <a:p>
+                      <a:pPr marL="0" marR="0" indent="0" algn="l" defTabSz="457200" rtl="0" eaLnBrk="1" fontAlgn="auto" latinLnBrk="0" hangingPunct="1">
+                        <a:lnSpc>
+                          <a:spcPct val="100000"/>
+                        </a:lnSpc>
+                        <a:spcBef>
+                          <a:spcPts val="0"/>
+                        </a:spcBef>
+                        <a:spcAft>
+                          <a:spcPts val="0"/>
+                        </a:spcAft>
+                        <a:buClrTx/>
+                        <a:buSzTx/>
+                        <a:buFontTx/>
+                        <a:buNone/>
+                        <a:tabLst/>
+                        <a:defRPr/>
+                      </a:pPr>
+                      <a:r>
+                        <a:rPr lang="en-US" sz="2800" dirty="0" smtClean="0"/>
+                        <a:t>Consuming web services</a:t>
+                      </a:r>
+                    </a:p>
+                  </a:txBody>
+                  <a:tcPr/>
+                </a:tc>
+              </a:tr>
+              <a:tr h="670658">
+                <a:tc>
+                  <a:txBody>
+                    <a:bodyPr/>
+                    <a:lstStyle/>
+                    <a:p>
+                      <a:r>
+                        <a:rPr lang="en-US" sz="2800" dirty="0" smtClean="0"/>
+                        <a:t>10</a:t>
+                      </a:r>
+                      <a:endParaRPr lang="en-US" sz="2800" dirty="0"/>
+                    </a:p>
+                  </a:txBody>
+                  <a:tcPr/>
+                </a:tc>
+                <a:tc>
+                  <a:txBody>
+                    <a:bodyPr/>
+                    <a:lstStyle/>
+                    <a:p>
+                      <a:pPr marL="0" marR="0" indent="0" algn="l" defTabSz="457200" rtl="0" eaLnBrk="1" fontAlgn="auto" latinLnBrk="0" hangingPunct="1">
+                        <a:lnSpc>
+                          <a:spcPct val="100000"/>
+                        </a:lnSpc>
+                        <a:spcBef>
+                          <a:spcPts val="0"/>
+                        </a:spcBef>
+                        <a:spcAft>
+                          <a:spcPts val="0"/>
+                        </a:spcAft>
+                        <a:buClrTx/>
+                        <a:buSzTx/>
+                        <a:buFontTx/>
+                        <a:buNone/>
+                        <a:tabLst/>
+                        <a:defRPr/>
+                      </a:pPr>
+                      <a:r>
+                        <a:rPr lang="en-US" sz="2800" dirty="0" err="1" smtClean="0"/>
+                        <a:t>Geolocation</a:t>
+                      </a:r>
+                      <a:endParaRPr lang="en-US" sz="2800" dirty="0" smtClean="0"/>
                     </a:p>
                   </a:txBody>
                   <a:tcPr/>
@@ -5406,7 +6068,7 @@
   <p:timing>
     <p:tnLst>
       <p:par>
-        <p:cTn xmlns:p14="http://schemas.microsoft.com/office/powerpoint/2010/main" id="1" dur="indefinite" restart="never" nodeType="tmRoot"/>
+        <p:cTn id="1" dur="indefinite" restart="never" nodeType="tmRoot"/>
       </p:par>
     </p:tnLst>
   </p:timing>

</xml_diff>